<commit_message>
chore: stood up unit tests for converting raw spectrum into power v frequency
</commit_message>
<xml_diff>
--- a/graphics.pptx
+++ b/graphics.pptx
@@ -2,10 +2,11 @@
 <file path=ppt/presentation.xml><?xml version="1.0" encoding="utf-8"?>
 <p:presentation xmlns:a="http://schemas.openxmlformats.org/drawingml/2006/main" xmlns:r="http://schemas.openxmlformats.org/officeDocument/2006/relationships" xmlns:p="http://schemas.openxmlformats.org/presentationml/2006/main" saveSubsetFonts="1">
   <p:sldMasterIdLst>
-    <p:sldMasterId id="2147483648" r:id="rId1"/>
+    <p:sldMasterId id="2147483660" r:id="rId1"/>
   </p:sldMasterIdLst>
   <p:sldIdLst>
-    <p:sldId id="256" r:id="rId2"/>
+    <p:sldId id="257" r:id="rId2"/>
+    <p:sldId id="256" r:id="rId3"/>
   </p:sldIdLst>
   <p:sldSz cx="12192000" cy="6858000"/>
   <p:notesSz cx="6858000" cy="9144000"/>
@@ -13,7 +14,7 @@
     <a:defPPr>
       <a:defRPr lang="en-US"/>
     </a:defPPr>
-    <a:lvl1pPr marL="0" algn="l" defTabSz="914400" rtl="0" eaLnBrk="1" latinLnBrk="0" hangingPunct="1">
+    <a:lvl1pPr marL="0" algn="l" defTabSz="457200" rtl="0" eaLnBrk="1" latinLnBrk="0" hangingPunct="1">
       <a:defRPr sz="1800" kern="1200">
         <a:solidFill>
           <a:schemeClr val="tx1"/>
@@ -23,7 +24,7 @@
         <a:cs typeface="+mn-cs"/>
       </a:defRPr>
     </a:lvl1pPr>
-    <a:lvl2pPr marL="457200" algn="l" defTabSz="914400" rtl="0" eaLnBrk="1" latinLnBrk="0" hangingPunct="1">
+    <a:lvl2pPr marL="457200" algn="l" defTabSz="457200" rtl="0" eaLnBrk="1" latinLnBrk="0" hangingPunct="1">
       <a:defRPr sz="1800" kern="1200">
         <a:solidFill>
           <a:schemeClr val="tx1"/>
@@ -33,7 +34,7 @@
         <a:cs typeface="+mn-cs"/>
       </a:defRPr>
     </a:lvl2pPr>
-    <a:lvl3pPr marL="914400" algn="l" defTabSz="914400" rtl="0" eaLnBrk="1" latinLnBrk="0" hangingPunct="1">
+    <a:lvl3pPr marL="914400" algn="l" defTabSz="457200" rtl="0" eaLnBrk="1" latinLnBrk="0" hangingPunct="1">
       <a:defRPr sz="1800" kern="1200">
         <a:solidFill>
           <a:schemeClr val="tx1"/>
@@ -43,7 +44,7 @@
         <a:cs typeface="+mn-cs"/>
       </a:defRPr>
     </a:lvl3pPr>
-    <a:lvl4pPr marL="1371600" algn="l" defTabSz="914400" rtl="0" eaLnBrk="1" latinLnBrk="0" hangingPunct="1">
+    <a:lvl4pPr marL="1371600" algn="l" defTabSz="457200" rtl="0" eaLnBrk="1" latinLnBrk="0" hangingPunct="1">
       <a:defRPr sz="1800" kern="1200">
         <a:solidFill>
           <a:schemeClr val="tx1"/>
@@ -53,7 +54,7 @@
         <a:cs typeface="+mn-cs"/>
       </a:defRPr>
     </a:lvl4pPr>
-    <a:lvl5pPr marL="1828800" algn="l" defTabSz="914400" rtl="0" eaLnBrk="1" latinLnBrk="0" hangingPunct="1">
+    <a:lvl5pPr marL="1828800" algn="l" defTabSz="457200" rtl="0" eaLnBrk="1" latinLnBrk="0" hangingPunct="1">
       <a:defRPr sz="1800" kern="1200">
         <a:solidFill>
           <a:schemeClr val="tx1"/>
@@ -63,7 +64,7 @@
         <a:cs typeface="+mn-cs"/>
       </a:defRPr>
     </a:lvl5pPr>
-    <a:lvl6pPr marL="2286000" algn="l" defTabSz="914400" rtl="0" eaLnBrk="1" latinLnBrk="0" hangingPunct="1">
+    <a:lvl6pPr marL="2286000" algn="l" defTabSz="457200" rtl="0" eaLnBrk="1" latinLnBrk="0" hangingPunct="1">
       <a:defRPr sz="1800" kern="1200">
         <a:solidFill>
           <a:schemeClr val="tx1"/>
@@ -73,7 +74,7 @@
         <a:cs typeface="+mn-cs"/>
       </a:defRPr>
     </a:lvl6pPr>
-    <a:lvl7pPr marL="2743200" algn="l" defTabSz="914400" rtl="0" eaLnBrk="1" latinLnBrk="0" hangingPunct="1">
+    <a:lvl7pPr marL="2743200" algn="l" defTabSz="457200" rtl="0" eaLnBrk="1" latinLnBrk="0" hangingPunct="1">
       <a:defRPr sz="1800" kern="1200">
         <a:solidFill>
           <a:schemeClr val="tx1"/>
@@ -83,7 +84,7 @@
         <a:cs typeface="+mn-cs"/>
       </a:defRPr>
     </a:lvl7pPr>
-    <a:lvl8pPr marL="3200400" algn="l" defTabSz="914400" rtl="0" eaLnBrk="1" latinLnBrk="0" hangingPunct="1">
+    <a:lvl8pPr marL="3200400" algn="l" defTabSz="457200" rtl="0" eaLnBrk="1" latinLnBrk="0" hangingPunct="1">
       <a:defRPr sz="1800" kern="1200">
         <a:solidFill>
           <a:schemeClr val="tx1"/>
@@ -93,7 +94,7 @@
         <a:cs typeface="+mn-cs"/>
       </a:defRPr>
     </a:lvl8pPr>
-    <a:lvl9pPr marL="3657600" algn="l" defTabSz="914400" rtl="0" eaLnBrk="1" latinLnBrk="0" hangingPunct="1">
+    <a:lvl9pPr marL="3657600" algn="l" defTabSz="457200" rtl="0" eaLnBrk="1" latinLnBrk="0" hangingPunct="1">
       <a:defRPr sz="1800" kern="1200">
         <a:solidFill>
           <a:schemeClr val="tx1"/>
@@ -104,6 +105,11 @@
       </a:defRPr>
     </a:lvl9pPr>
   </p:defaultTextStyle>
+  <p:extLst>
+    <p:ext uri="{EFAFB233-063F-42B5-8137-9DF3F51BA10A}">
+      <p15:sldGuideLst xmlns:p15="http://schemas.microsoft.com/office/powerpoint/2012/main"/>
+    </p:ext>
+  </p:extLst>
 </p:presentation>
 </file>
 
@@ -126,13 +132,7 @@
       </p:grpSpPr>
       <p:sp>
         <p:nvSpPr>
-          <p:cNvPr id="2" name="Title 1">
-            <a:extLst>
-              <a:ext uri="{FF2B5EF4-FFF2-40B4-BE49-F238E27FC236}">
-                <a16:creationId xmlns:a16="http://schemas.microsoft.com/office/drawing/2014/main" id="{D369DD56-5288-4DAD-1692-80E3ABAAEC5E}"/>
-              </a:ext>
-            </a:extLst>
-          </p:cNvPr>
+          <p:cNvPr id="2" name="Title 1"/>
           <p:cNvSpPr>
             <a:spLocks noGrp="1"/>
           </p:cNvSpPr>
@@ -158,18 +158,13 @@
               <a:rPr lang="en-US"/>
               <a:t>Click to edit Master title style</a:t>
             </a:r>
-          </a:p>
-        </p:txBody>
-      </p:sp>
-      <p:sp>
-        <p:nvSpPr>
-          <p:cNvPr id="3" name="Subtitle 2">
-            <a:extLst>
-              <a:ext uri="{FF2B5EF4-FFF2-40B4-BE49-F238E27FC236}">
-                <a16:creationId xmlns:a16="http://schemas.microsoft.com/office/drawing/2014/main" id="{0919869C-A533-6A6D-611C-FDB3EF52CD38}"/>
-              </a:ext>
-            </a:extLst>
-          </p:cNvPr>
+            <a:endParaRPr lang="en-US" dirty="0"/>
+          </a:p>
+        </p:txBody>
+      </p:sp>
+      <p:sp>
+        <p:nvSpPr>
+          <p:cNvPr id="3" name="Subtitle 2"/>
           <p:cNvSpPr>
             <a:spLocks noGrp="1"/>
           </p:cNvSpPr>
@@ -228,18 +223,13 @@
               <a:rPr lang="en-US"/>
               <a:t>Click to edit Master subtitle style</a:t>
             </a:r>
-          </a:p>
-        </p:txBody>
-      </p:sp>
-      <p:sp>
-        <p:nvSpPr>
-          <p:cNvPr id="4" name="Date Placeholder 3">
-            <a:extLst>
-              <a:ext uri="{FF2B5EF4-FFF2-40B4-BE49-F238E27FC236}">
-                <a16:creationId xmlns:a16="http://schemas.microsoft.com/office/drawing/2014/main" id="{01370F13-208E-F535-78D5-1974CF048AC1}"/>
-              </a:ext>
-            </a:extLst>
-          </p:cNvPr>
+            <a:endParaRPr lang="en-US" dirty="0"/>
+          </a:p>
+        </p:txBody>
+      </p:sp>
+      <p:sp>
+        <p:nvSpPr>
+          <p:cNvPr id="4" name="Date Placeholder 3"/>
           <p:cNvSpPr>
             <a:spLocks noGrp="1"/>
           </p:cNvSpPr>
@@ -254,7 +244,7 @@
           <a:p>
             <a:fld id="{7A152AC1-BF1E-435C-86CC-AC2CC089CEC7}" type="datetimeFigureOut">
               <a:rPr lang="en-US" smtClean="0"/>
-              <a:t>1/18/2024</a:t>
+              <a:t>1/26/2024</a:t>
             </a:fld>
             <a:endParaRPr lang="en-US"/>
           </a:p>
@@ -262,13 +252,7 @@
       </p:sp>
       <p:sp>
         <p:nvSpPr>
-          <p:cNvPr id="5" name="Footer Placeholder 4">
-            <a:extLst>
-              <a:ext uri="{FF2B5EF4-FFF2-40B4-BE49-F238E27FC236}">
-                <a16:creationId xmlns:a16="http://schemas.microsoft.com/office/drawing/2014/main" id="{02E8851B-F193-5B7F-C22C-6B64641E2474}"/>
-              </a:ext>
-            </a:extLst>
-          </p:cNvPr>
+          <p:cNvPr id="5" name="Footer Placeholder 4"/>
           <p:cNvSpPr>
             <a:spLocks noGrp="1"/>
           </p:cNvSpPr>
@@ -287,13 +271,7 @@
       </p:sp>
       <p:sp>
         <p:nvSpPr>
-          <p:cNvPr id="6" name="Slide Number Placeholder 5">
-            <a:extLst>
-              <a:ext uri="{FF2B5EF4-FFF2-40B4-BE49-F238E27FC236}">
-                <a16:creationId xmlns:a16="http://schemas.microsoft.com/office/drawing/2014/main" id="{C2562E11-6EF8-4274-1E44-A296DA684163}"/>
-              </a:ext>
-            </a:extLst>
-          </p:cNvPr>
+          <p:cNvPr id="6" name="Slide Number Placeholder 5"/>
           <p:cNvSpPr>
             <a:spLocks noGrp="1"/>
           </p:cNvSpPr>
@@ -317,7 +295,7 @@
     </p:spTree>
     <p:extLst>
       <p:ext uri="{BB962C8B-B14F-4D97-AF65-F5344CB8AC3E}">
-        <p14:creationId xmlns:p14="http://schemas.microsoft.com/office/powerpoint/2010/main" val="1076483344"/>
+        <p14:creationId xmlns:p14="http://schemas.microsoft.com/office/powerpoint/2010/main" val="1555273812"/>
       </p:ext>
     </p:extLst>
   </p:cSld>
@@ -346,13 +324,7 @@
       </p:grpSpPr>
       <p:sp>
         <p:nvSpPr>
-          <p:cNvPr id="2" name="Title 1">
-            <a:extLst>
-              <a:ext uri="{FF2B5EF4-FFF2-40B4-BE49-F238E27FC236}">
-                <a16:creationId xmlns:a16="http://schemas.microsoft.com/office/drawing/2014/main" id="{5CD8492D-9D31-6854-2899-685A86886F49}"/>
-              </a:ext>
-            </a:extLst>
-          </p:cNvPr>
+          <p:cNvPr id="2" name="Title 1"/>
           <p:cNvSpPr>
             <a:spLocks noGrp="1"/>
           </p:cNvSpPr>
@@ -369,18 +341,13 @@
               <a:rPr lang="en-US"/>
               <a:t>Click to edit Master title style</a:t>
             </a:r>
-          </a:p>
-        </p:txBody>
-      </p:sp>
-      <p:sp>
-        <p:nvSpPr>
-          <p:cNvPr id="3" name="Vertical Text Placeholder 2">
-            <a:extLst>
-              <a:ext uri="{FF2B5EF4-FFF2-40B4-BE49-F238E27FC236}">
-                <a16:creationId xmlns:a16="http://schemas.microsoft.com/office/drawing/2014/main" id="{E01E3D08-BEB4-AEFE-402C-B8812E050FE8}"/>
-              </a:ext>
-            </a:extLst>
-          </p:cNvPr>
+            <a:endParaRPr lang="en-US" dirty="0"/>
+          </a:p>
+        </p:txBody>
+      </p:sp>
+      <p:sp>
+        <p:nvSpPr>
+          <p:cNvPr id="3" name="Vertical Text Placeholder 2"/>
           <p:cNvSpPr>
             <a:spLocks noGrp="1"/>
           </p:cNvSpPr>
@@ -426,18 +393,13 @@
               <a:rPr lang="en-US"/>
               <a:t>Fifth level</a:t>
             </a:r>
-          </a:p>
-        </p:txBody>
-      </p:sp>
-      <p:sp>
-        <p:nvSpPr>
-          <p:cNvPr id="4" name="Date Placeholder 3">
-            <a:extLst>
-              <a:ext uri="{FF2B5EF4-FFF2-40B4-BE49-F238E27FC236}">
-                <a16:creationId xmlns:a16="http://schemas.microsoft.com/office/drawing/2014/main" id="{F232E9AB-AAA1-BFEA-849C-3E07097BFD7B}"/>
-              </a:ext>
-            </a:extLst>
-          </p:cNvPr>
+            <a:endParaRPr lang="en-US" dirty="0"/>
+          </a:p>
+        </p:txBody>
+      </p:sp>
+      <p:sp>
+        <p:nvSpPr>
+          <p:cNvPr id="4" name="Date Placeholder 3"/>
           <p:cNvSpPr>
             <a:spLocks noGrp="1"/>
           </p:cNvSpPr>
@@ -452,7 +414,7 @@
           <a:p>
             <a:fld id="{7A152AC1-BF1E-435C-86CC-AC2CC089CEC7}" type="datetimeFigureOut">
               <a:rPr lang="en-US" smtClean="0"/>
-              <a:t>1/18/2024</a:t>
+              <a:t>1/26/2024</a:t>
             </a:fld>
             <a:endParaRPr lang="en-US"/>
           </a:p>
@@ -460,13 +422,7 @@
       </p:sp>
       <p:sp>
         <p:nvSpPr>
-          <p:cNvPr id="5" name="Footer Placeholder 4">
-            <a:extLst>
-              <a:ext uri="{FF2B5EF4-FFF2-40B4-BE49-F238E27FC236}">
-                <a16:creationId xmlns:a16="http://schemas.microsoft.com/office/drawing/2014/main" id="{9696C036-8BA9-8A90-643B-1D1777C9608E}"/>
-              </a:ext>
-            </a:extLst>
-          </p:cNvPr>
+          <p:cNvPr id="5" name="Footer Placeholder 4"/>
           <p:cNvSpPr>
             <a:spLocks noGrp="1"/>
           </p:cNvSpPr>
@@ -485,13 +441,7 @@
       </p:sp>
       <p:sp>
         <p:nvSpPr>
-          <p:cNvPr id="6" name="Slide Number Placeholder 5">
-            <a:extLst>
-              <a:ext uri="{FF2B5EF4-FFF2-40B4-BE49-F238E27FC236}">
-                <a16:creationId xmlns:a16="http://schemas.microsoft.com/office/drawing/2014/main" id="{32780A96-F206-8673-E2B3-70A55A0993A5}"/>
-              </a:ext>
-            </a:extLst>
-          </p:cNvPr>
+          <p:cNvPr id="6" name="Slide Number Placeholder 5"/>
           <p:cNvSpPr>
             <a:spLocks noGrp="1"/>
           </p:cNvSpPr>
@@ -515,7 +465,7 @@
     </p:spTree>
     <p:extLst>
       <p:ext uri="{BB962C8B-B14F-4D97-AF65-F5344CB8AC3E}">
-        <p14:creationId xmlns:p14="http://schemas.microsoft.com/office/powerpoint/2010/main" val="2304483314"/>
+        <p14:creationId xmlns:p14="http://schemas.microsoft.com/office/powerpoint/2010/main" val="1679290393"/>
       </p:ext>
     </p:extLst>
   </p:cSld>
@@ -544,13 +494,7 @@
       </p:grpSpPr>
       <p:sp>
         <p:nvSpPr>
-          <p:cNvPr id="2" name="Vertical Title 1">
-            <a:extLst>
-              <a:ext uri="{FF2B5EF4-FFF2-40B4-BE49-F238E27FC236}">
-                <a16:creationId xmlns:a16="http://schemas.microsoft.com/office/drawing/2014/main" id="{9879A29E-6B5C-7858-B96F-6CCD1177A79A}"/>
-              </a:ext>
-            </a:extLst>
-          </p:cNvPr>
+          <p:cNvPr id="2" name="Vertical Title 1"/>
           <p:cNvSpPr>
             <a:spLocks noGrp="1"/>
           </p:cNvSpPr>
@@ -572,18 +516,13 @@
               <a:rPr lang="en-US"/>
               <a:t>Click to edit Master title style</a:t>
             </a:r>
-          </a:p>
-        </p:txBody>
-      </p:sp>
-      <p:sp>
-        <p:nvSpPr>
-          <p:cNvPr id="3" name="Vertical Text Placeholder 2">
-            <a:extLst>
-              <a:ext uri="{FF2B5EF4-FFF2-40B4-BE49-F238E27FC236}">
-                <a16:creationId xmlns:a16="http://schemas.microsoft.com/office/drawing/2014/main" id="{E6DAD13F-943B-0850-27A2-404DFB0DB7A0}"/>
-              </a:ext>
-            </a:extLst>
-          </p:cNvPr>
+            <a:endParaRPr lang="en-US" dirty="0"/>
+          </a:p>
+        </p:txBody>
+      </p:sp>
+      <p:sp>
+        <p:nvSpPr>
+          <p:cNvPr id="3" name="Vertical Text Placeholder 2"/>
           <p:cNvSpPr>
             <a:spLocks noGrp="1"/>
           </p:cNvSpPr>
@@ -634,18 +573,13 @@
               <a:rPr lang="en-US"/>
               <a:t>Fifth level</a:t>
             </a:r>
-          </a:p>
-        </p:txBody>
-      </p:sp>
-      <p:sp>
-        <p:nvSpPr>
-          <p:cNvPr id="4" name="Date Placeholder 3">
-            <a:extLst>
-              <a:ext uri="{FF2B5EF4-FFF2-40B4-BE49-F238E27FC236}">
-                <a16:creationId xmlns:a16="http://schemas.microsoft.com/office/drawing/2014/main" id="{D1334450-B68E-F86F-8D2F-75F36B79D1F4}"/>
-              </a:ext>
-            </a:extLst>
-          </p:cNvPr>
+            <a:endParaRPr lang="en-US" dirty="0"/>
+          </a:p>
+        </p:txBody>
+      </p:sp>
+      <p:sp>
+        <p:nvSpPr>
+          <p:cNvPr id="4" name="Date Placeholder 3"/>
           <p:cNvSpPr>
             <a:spLocks noGrp="1"/>
           </p:cNvSpPr>
@@ -660,7 +594,7 @@
           <a:p>
             <a:fld id="{7A152AC1-BF1E-435C-86CC-AC2CC089CEC7}" type="datetimeFigureOut">
               <a:rPr lang="en-US" smtClean="0"/>
-              <a:t>1/18/2024</a:t>
+              <a:t>1/26/2024</a:t>
             </a:fld>
             <a:endParaRPr lang="en-US"/>
           </a:p>
@@ -668,13 +602,7 @@
       </p:sp>
       <p:sp>
         <p:nvSpPr>
-          <p:cNvPr id="5" name="Footer Placeholder 4">
-            <a:extLst>
-              <a:ext uri="{FF2B5EF4-FFF2-40B4-BE49-F238E27FC236}">
-                <a16:creationId xmlns:a16="http://schemas.microsoft.com/office/drawing/2014/main" id="{AB15D85D-60A9-5F41-08A3-3F98FDF97A60}"/>
-              </a:ext>
-            </a:extLst>
-          </p:cNvPr>
+          <p:cNvPr id="5" name="Footer Placeholder 4"/>
           <p:cNvSpPr>
             <a:spLocks noGrp="1"/>
           </p:cNvSpPr>
@@ -693,13 +621,7 @@
       </p:sp>
       <p:sp>
         <p:nvSpPr>
-          <p:cNvPr id="6" name="Slide Number Placeholder 5">
-            <a:extLst>
-              <a:ext uri="{FF2B5EF4-FFF2-40B4-BE49-F238E27FC236}">
-                <a16:creationId xmlns:a16="http://schemas.microsoft.com/office/drawing/2014/main" id="{31334EF7-A4C2-71EB-091C-154B3113AAC2}"/>
-              </a:ext>
-            </a:extLst>
-          </p:cNvPr>
+          <p:cNvPr id="6" name="Slide Number Placeholder 5"/>
           <p:cNvSpPr>
             <a:spLocks noGrp="1"/>
           </p:cNvSpPr>
@@ -723,7 +645,7 @@
     </p:spTree>
     <p:extLst>
       <p:ext uri="{BB962C8B-B14F-4D97-AF65-F5344CB8AC3E}">
-        <p14:creationId xmlns:p14="http://schemas.microsoft.com/office/powerpoint/2010/main" val="3165269530"/>
+        <p14:creationId xmlns:p14="http://schemas.microsoft.com/office/powerpoint/2010/main" val="1593048879"/>
       </p:ext>
     </p:extLst>
   </p:cSld>
@@ -752,13 +674,7 @@
       </p:grpSpPr>
       <p:sp>
         <p:nvSpPr>
-          <p:cNvPr id="2" name="Title 1">
-            <a:extLst>
-              <a:ext uri="{FF2B5EF4-FFF2-40B4-BE49-F238E27FC236}">
-                <a16:creationId xmlns:a16="http://schemas.microsoft.com/office/drawing/2014/main" id="{C0BB2893-D22F-121F-E2BC-E4044B65921D}"/>
-              </a:ext>
-            </a:extLst>
-          </p:cNvPr>
+          <p:cNvPr id="2" name="Title 1"/>
           <p:cNvSpPr>
             <a:spLocks noGrp="1"/>
           </p:cNvSpPr>
@@ -775,18 +691,13 @@
               <a:rPr lang="en-US"/>
               <a:t>Click to edit Master title style</a:t>
             </a:r>
-          </a:p>
-        </p:txBody>
-      </p:sp>
-      <p:sp>
-        <p:nvSpPr>
-          <p:cNvPr id="3" name="Content Placeholder 2">
-            <a:extLst>
-              <a:ext uri="{FF2B5EF4-FFF2-40B4-BE49-F238E27FC236}">
-                <a16:creationId xmlns:a16="http://schemas.microsoft.com/office/drawing/2014/main" id="{50EDD672-94C0-1184-BAE0-2BB1C4CC752B}"/>
-              </a:ext>
-            </a:extLst>
-          </p:cNvPr>
+            <a:endParaRPr lang="en-US" dirty="0"/>
+          </a:p>
+        </p:txBody>
+      </p:sp>
+      <p:sp>
+        <p:nvSpPr>
+          <p:cNvPr id="3" name="Content Placeholder 2"/>
           <p:cNvSpPr>
             <a:spLocks noGrp="1"/>
           </p:cNvSpPr>
@@ -832,18 +743,13 @@
               <a:rPr lang="en-US"/>
               <a:t>Fifth level</a:t>
             </a:r>
-          </a:p>
-        </p:txBody>
-      </p:sp>
-      <p:sp>
-        <p:nvSpPr>
-          <p:cNvPr id="4" name="Date Placeholder 3">
-            <a:extLst>
-              <a:ext uri="{FF2B5EF4-FFF2-40B4-BE49-F238E27FC236}">
-                <a16:creationId xmlns:a16="http://schemas.microsoft.com/office/drawing/2014/main" id="{0F4C52FA-18F5-0C34-8A1B-7487955C67CB}"/>
-              </a:ext>
-            </a:extLst>
-          </p:cNvPr>
+            <a:endParaRPr lang="en-US" dirty="0"/>
+          </a:p>
+        </p:txBody>
+      </p:sp>
+      <p:sp>
+        <p:nvSpPr>
+          <p:cNvPr id="4" name="Date Placeholder 3"/>
           <p:cNvSpPr>
             <a:spLocks noGrp="1"/>
           </p:cNvSpPr>
@@ -858,7 +764,7 @@
           <a:p>
             <a:fld id="{7A152AC1-BF1E-435C-86CC-AC2CC089CEC7}" type="datetimeFigureOut">
               <a:rPr lang="en-US" smtClean="0"/>
-              <a:t>1/18/2024</a:t>
+              <a:t>1/26/2024</a:t>
             </a:fld>
             <a:endParaRPr lang="en-US"/>
           </a:p>
@@ -866,13 +772,7 @@
       </p:sp>
       <p:sp>
         <p:nvSpPr>
-          <p:cNvPr id="5" name="Footer Placeholder 4">
-            <a:extLst>
-              <a:ext uri="{FF2B5EF4-FFF2-40B4-BE49-F238E27FC236}">
-                <a16:creationId xmlns:a16="http://schemas.microsoft.com/office/drawing/2014/main" id="{EBFF7231-A476-3EEB-FA48-E80A03443E28}"/>
-              </a:ext>
-            </a:extLst>
-          </p:cNvPr>
+          <p:cNvPr id="5" name="Footer Placeholder 4"/>
           <p:cNvSpPr>
             <a:spLocks noGrp="1"/>
           </p:cNvSpPr>
@@ -891,13 +791,7 @@
       </p:sp>
       <p:sp>
         <p:nvSpPr>
-          <p:cNvPr id="6" name="Slide Number Placeholder 5">
-            <a:extLst>
-              <a:ext uri="{FF2B5EF4-FFF2-40B4-BE49-F238E27FC236}">
-                <a16:creationId xmlns:a16="http://schemas.microsoft.com/office/drawing/2014/main" id="{68B7D726-94B9-863D-0DEF-584E30308073}"/>
-              </a:ext>
-            </a:extLst>
-          </p:cNvPr>
+          <p:cNvPr id="6" name="Slide Number Placeholder 5"/>
           <p:cNvSpPr>
             <a:spLocks noGrp="1"/>
           </p:cNvSpPr>
@@ -921,7 +815,7 @@
     </p:spTree>
     <p:extLst>
       <p:ext uri="{BB962C8B-B14F-4D97-AF65-F5344CB8AC3E}">
-        <p14:creationId xmlns:p14="http://schemas.microsoft.com/office/powerpoint/2010/main" val="3070170878"/>
+        <p14:creationId xmlns:p14="http://schemas.microsoft.com/office/powerpoint/2010/main" val="1641889528"/>
       </p:ext>
     </p:extLst>
   </p:cSld>
@@ -950,13 +844,7 @@
       </p:grpSpPr>
       <p:sp>
         <p:nvSpPr>
-          <p:cNvPr id="2" name="Title 1">
-            <a:extLst>
-              <a:ext uri="{FF2B5EF4-FFF2-40B4-BE49-F238E27FC236}">
-                <a16:creationId xmlns:a16="http://schemas.microsoft.com/office/drawing/2014/main" id="{E51507BB-015E-4AA9-D087-7B61B59849DB}"/>
-              </a:ext>
-            </a:extLst>
-          </p:cNvPr>
+          <p:cNvPr id="2" name="Title 1"/>
           <p:cNvSpPr>
             <a:spLocks noGrp="1"/>
           </p:cNvSpPr>
@@ -982,18 +870,13 @@
               <a:rPr lang="en-US"/>
               <a:t>Click to edit Master title style</a:t>
             </a:r>
-          </a:p>
-        </p:txBody>
-      </p:sp>
-      <p:sp>
-        <p:nvSpPr>
-          <p:cNvPr id="3" name="Text Placeholder 2">
-            <a:extLst>
-              <a:ext uri="{FF2B5EF4-FFF2-40B4-BE49-F238E27FC236}">
-                <a16:creationId xmlns:a16="http://schemas.microsoft.com/office/drawing/2014/main" id="{1223C418-AA02-B8D3-5A08-7F6D14C48A12}"/>
-              </a:ext>
-            </a:extLst>
-          </p:cNvPr>
+            <a:endParaRPr lang="en-US" dirty="0"/>
+          </a:p>
+        </p:txBody>
+      </p:sp>
+      <p:sp>
+        <p:nvSpPr>
+          <p:cNvPr id="3" name="Text Placeholder 2"/>
           <p:cNvSpPr>
             <a:spLocks noGrp="1"/>
           </p:cNvSpPr>
@@ -1112,13 +995,7 @@
       </p:sp>
       <p:sp>
         <p:nvSpPr>
-          <p:cNvPr id="4" name="Date Placeholder 3">
-            <a:extLst>
-              <a:ext uri="{FF2B5EF4-FFF2-40B4-BE49-F238E27FC236}">
-                <a16:creationId xmlns:a16="http://schemas.microsoft.com/office/drawing/2014/main" id="{C17766D0-9F06-42D9-A2E1-B2162793CE0C}"/>
-              </a:ext>
-            </a:extLst>
-          </p:cNvPr>
+          <p:cNvPr id="4" name="Date Placeholder 3"/>
           <p:cNvSpPr>
             <a:spLocks noGrp="1"/>
           </p:cNvSpPr>
@@ -1133,7 +1010,7 @@
           <a:p>
             <a:fld id="{7A152AC1-BF1E-435C-86CC-AC2CC089CEC7}" type="datetimeFigureOut">
               <a:rPr lang="en-US" smtClean="0"/>
-              <a:t>1/18/2024</a:t>
+              <a:t>1/26/2024</a:t>
             </a:fld>
             <a:endParaRPr lang="en-US"/>
           </a:p>
@@ -1141,13 +1018,7 @@
       </p:sp>
       <p:sp>
         <p:nvSpPr>
-          <p:cNvPr id="5" name="Footer Placeholder 4">
-            <a:extLst>
-              <a:ext uri="{FF2B5EF4-FFF2-40B4-BE49-F238E27FC236}">
-                <a16:creationId xmlns:a16="http://schemas.microsoft.com/office/drawing/2014/main" id="{F1B45C7C-EC10-308D-584A-26DA8D09F0EA}"/>
-              </a:ext>
-            </a:extLst>
-          </p:cNvPr>
+          <p:cNvPr id="5" name="Footer Placeholder 4"/>
           <p:cNvSpPr>
             <a:spLocks noGrp="1"/>
           </p:cNvSpPr>
@@ -1166,13 +1037,7 @@
       </p:sp>
       <p:sp>
         <p:nvSpPr>
-          <p:cNvPr id="6" name="Slide Number Placeholder 5">
-            <a:extLst>
-              <a:ext uri="{FF2B5EF4-FFF2-40B4-BE49-F238E27FC236}">
-                <a16:creationId xmlns:a16="http://schemas.microsoft.com/office/drawing/2014/main" id="{2B6DF707-E7A1-F773-8B5F-6E3A9193D7FD}"/>
-              </a:ext>
-            </a:extLst>
-          </p:cNvPr>
+          <p:cNvPr id="6" name="Slide Number Placeholder 5"/>
           <p:cNvSpPr>
             <a:spLocks noGrp="1"/>
           </p:cNvSpPr>
@@ -1196,7 +1061,7 @@
     </p:spTree>
     <p:extLst>
       <p:ext uri="{BB962C8B-B14F-4D97-AF65-F5344CB8AC3E}">
-        <p14:creationId xmlns:p14="http://schemas.microsoft.com/office/powerpoint/2010/main" val="2245255729"/>
+        <p14:creationId xmlns:p14="http://schemas.microsoft.com/office/powerpoint/2010/main" val="4029879085"/>
       </p:ext>
     </p:extLst>
   </p:cSld>
@@ -1225,13 +1090,7 @@
       </p:grpSpPr>
       <p:sp>
         <p:nvSpPr>
-          <p:cNvPr id="2" name="Title 1">
-            <a:extLst>
-              <a:ext uri="{FF2B5EF4-FFF2-40B4-BE49-F238E27FC236}">
-                <a16:creationId xmlns:a16="http://schemas.microsoft.com/office/drawing/2014/main" id="{AB6C2CC2-4B0E-2C2E-C3DE-BEE051D6B065}"/>
-              </a:ext>
-            </a:extLst>
-          </p:cNvPr>
+          <p:cNvPr id="2" name="Title 1"/>
           <p:cNvSpPr>
             <a:spLocks noGrp="1"/>
           </p:cNvSpPr>
@@ -1248,18 +1107,13 @@
               <a:rPr lang="en-US"/>
               <a:t>Click to edit Master title style</a:t>
             </a:r>
-          </a:p>
-        </p:txBody>
-      </p:sp>
-      <p:sp>
-        <p:nvSpPr>
-          <p:cNvPr id="3" name="Content Placeholder 2">
-            <a:extLst>
-              <a:ext uri="{FF2B5EF4-FFF2-40B4-BE49-F238E27FC236}">
-                <a16:creationId xmlns:a16="http://schemas.microsoft.com/office/drawing/2014/main" id="{CF31D105-0ADB-C128-B3EB-6E9D4415EE91}"/>
-              </a:ext>
-            </a:extLst>
-          </p:cNvPr>
+            <a:endParaRPr lang="en-US" dirty="0"/>
+          </a:p>
+        </p:txBody>
+      </p:sp>
+      <p:sp>
+        <p:nvSpPr>
+          <p:cNvPr id="3" name="Content Placeholder 2"/>
           <p:cNvSpPr>
             <a:spLocks noGrp="1"/>
           </p:cNvSpPr>
@@ -1310,18 +1164,13 @@
               <a:rPr lang="en-US"/>
               <a:t>Fifth level</a:t>
             </a:r>
-          </a:p>
-        </p:txBody>
-      </p:sp>
-      <p:sp>
-        <p:nvSpPr>
-          <p:cNvPr id="4" name="Content Placeholder 3">
-            <a:extLst>
-              <a:ext uri="{FF2B5EF4-FFF2-40B4-BE49-F238E27FC236}">
-                <a16:creationId xmlns:a16="http://schemas.microsoft.com/office/drawing/2014/main" id="{FA2F0B40-AE57-4B91-FD06-BB455E182E5F}"/>
-              </a:ext>
-            </a:extLst>
-          </p:cNvPr>
+            <a:endParaRPr lang="en-US" dirty="0"/>
+          </a:p>
+        </p:txBody>
+      </p:sp>
+      <p:sp>
+        <p:nvSpPr>
+          <p:cNvPr id="4" name="Content Placeholder 3"/>
           <p:cNvSpPr>
             <a:spLocks noGrp="1"/>
           </p:cNvSpPr>
@@ -1372,18 +1221,13 @@
               <a:rPr lang="en-US"/>
               <a:t>Fifth level</a:t>
             </a:r>
-          </a:p>
-        </p:txBody>
-      </p:sp>
-      <p:sp>
-        <p:nvSpPr>
-          <p:cNvPr id="5" name="Date Placeholder 4">
-            <a:extLst>
-              <a:ext uri="{FF2B5EF4-FFF2-40B4-BE49-F238E27FC236}">
-                <a16:creationId xmlns:a16="http://schemas.microsoft.com/office/drawing/2014/main" id="{9B57C277-B24C-48CD-500C-5F1409082BC5}"/>
-              </a:ext>
-            </a:extLst>
-          </p:cNvPr>
+            <a:endParaRPr lang="en-US" dirty="0"/>
+          </a:p>
+        </p:txBody>
+      </p:sp>
+      <p:sp>
+        <p:nvSpPr>
+          <p:cNvPr id="5" name="Date Placeholder 4"/>
           <p:cNvSpPr>
             <a:spLocks noGrp="1"/>
           </p:cNvSpPr>
@@ -1398,7 +1242,7 @@
           <a:p>
             <a:fld id="{7A152AC1-BF1E-435C-86CC-AC2CC089CEC7}" type="datetimeFigureOut">
               <a:rPr lang="en-US" smtClean="0"/>
-              <a:t>1/18/2024</a:t>
+              <a:t>1/26/2024</a:t>
             </a:fld>
             <a:endParaRPr lang="en-US"/>
           </a:p>
@@ -1406,13 +1250,7 @@
       </p:sp>
       <p:sp>
         <p:nvSpPr>
-          <p:cNvPr id="6" name="Footer Placeholder 5">
-            <a:extLst>
-              <a:ext uri="{FF2B5EF4-FFF2-40B4-BE49-F238E27FC236}">
-                <a16:creationId xmlns:a16="http://schemas.microsoft.com/office/drawing/2014/main" id="{508338BC-CE57-57DA-7D14-2834F9801C5D}"/>
-              </a:ext>
-            </a:extLst>
-          </p:cNvPr>
+          <p:cNvPr id="6" name="Footer Placeholder 5"/>
           <p:cNvSpPr>
             <a:spLocks noGrp="1"/>
           </p:cNvSpPr>
@@ -1431,13 +1269,7 @@
       </p:sp>
       <p:sp>
         <p:nvSpPr>
-          <p:cNvPr id="7" name="Slide Number Placeholder 6">
-            <a:extLst>
-              <a:ext uri="{FF2B5EF4-FFF2-40B4-BE49-F238E27FC236}">
-                <a16:creationId xmlns:a16="http://schemas.microsoft.com/office/drawing/2014/main" id="{694BFA75-9FA2-0A08-63C5-6BB2470F06BA}"/>
-              </a:ext>
-            </a:extLst>
-          </p:cNvPr>
+          <p:cNvPr id="7" name="Slide Number Placeholder 6"/>
           <p:cNvSpPr>
             <a:spLocks noGrp="1"/>
           </p:cNvSpPr>
@@ -1461,7 +1293,7 @@
     </p:spTree>
     <p:extLst>
       <p:ext uri="{BB962C8B-B14F-4D97-AF65-F5344CB8AC3E}">
-        <p14:creationId xmlns:p14="http://schemas.microsoft.com/office/powerpoint/2010/main" val="2648951830"/>
+        <p14:creationId xmlns:p14="http://schemas.microsoft.com/office/powerpoint/2010/main" val="1513306085"/>
       </p:ext>
     </p:extLst>
   </p:cSld>
@@ -1490,13 +1322,7 @@
       </p:grpSpPr>
       <p:sp>
         <p:nvSpPr>
-          <p:cNvPr id="2" name="Title 1">
-            <a:extLst>
-              <a:ext uri="{FF2B5EF4-FFF2-40B4-BE49-F238E27FC236}">
-                <a16:creationId xmlns:a16="http://schemas.microsoft.com/office/drawing/2014/main" id="{D3EF3842-1D7F-F715-4518-437F8F20A3B0}"/>
-              </a:ext>
-            </a:extLst>
-          </p:cNvPr>
+          <p:cNvPr id="2" name="Title 1"/>
           <p:cNvSpPr>
             <a:spLocks noGrp="1"/>
           </p:cNvSpPr>
@@ -1518,18 +1344,13 @@
               <a:rPr lang="en-US"/>
               <a:t>Click to edit Master title style</a:t>
             </a:r>
-          </a:p>
-        </p:txBody>
-      </p:sp>
-      <p:sp>
-        <p:nvSpPr>
-          <p:cNvPr id="3" name="Text Placeholder 2">
-            <a:extLst>
-              <a:ext uri="{FF2B5EF4-FFF2-40B4-BE49-F238E27FC236}">
-                <a16:creationId xmlns:a16="http://schemas.microsoft.com/office/drawing/2014/main" id="{1F1DD634-D312-6ACC-A8A8-36FD12F2DAC0}"/>
-              </a:ext>
-            </a:extLst>
-          </p:cNvPr>
+            <a:endParaRPr lang="en-US" dirty="0"/>
+          </a:p>
+        </p:txBody>
+      </p:sp>
+      <p:sp>
+        <p:nvSpPr>
+          <p:cNvPr id="3" name="Text Placeholder 2"/>
           <p:cNvSpPr>
             <a:spLocks noGrp="1"/>
           </p:cNvSpPr>
@@ -1594,13 +1415,7 @@
       </p:sp>
       <p:sp>
         <p:nvSpPr>
-          <p:cNvPr id="4" name="Content Placeholder 3">
-            <a:extLst>
-              <a:ext uri="{FF2B5EF4-FFF2-40B4-BE49-F238E27FC236}">
-                <a16:creationId xmlns:a16="http://schemas.microsoft.com/office/drawing/2014/main" id="{7E34D124-A376-DBE8-6B5F-FB7A78383DBF}"/>
-              </a:ext>
-            </a:extLst>
-          </p:cNvPr>
+          <p:cNvPr id="4" name="Content Placeholder 3"/>
           <p:cNvSpPr>
             <a:spLocks noGrp="1"/>
           </p:cNvSpPr>
@@ -1651,18 +1466,13 @@
               <a:rPr lang="en-US"/>
               <a:t>Fifth level</a:t>
             </a:r>
-          </a:p>
-        </p:txBody>
-      </p:sp>
-      <p:sp>
-        <p:nvSpPr>
-          <p:cNvPr id="5" name="Text Placeholder 4">
-            <a:extLst>
-              <a:ext uri="{FF2B5EF4-FFF2-40B4-BE49-F238E27FC236}">
-                <a16:creationId xmlns:a16="http://schemas.microsoft.com/office/drawing/2014/main" id="{F253681D-6427-9773-7250-DAF781A3902D}"/>
-              </a:ext>
-            </a:extLst>
-          </p:cNvPr>
+            <a:endParaRPr lang="en-US" dirty="0"/>
+          </a:p>
+        </p:txBody>
+      </p:sp>
+      <p:sp>
+        <p:nvSpPr>
+          <p:cNvPr id="5" name="Text Placeholder 4"/>
           <p:cNvSpPr>
             <a:spLocks noGrp="1"/>
           </p:cNvSpPr>
@@ -1727,13 +1537,7 @@
       </p:sp>
       <p:sp>
         <p:nvSpPr>
-          <p:cNvPr id="6" name="Content Placeholder 5">
-            <a:extLst>
-              <a:ext uri="{FF2B5EF4-FFF2-40B4-BE49-F238E27FC236}">
-                <a16:creationId xmlns:a16="http://schemas.microsoft.com/office/drawing/2014/main" id="{A502014A-C474-862B-EF41-01120918C1E0}"/>
-              </a:ext>
-            </a:extLst>
-          </p:cNvPr>
+          <p:cNvPr id="6" name="Content Placeholder 5"/>
           <p:cNvSpPr>
             <a:spLocks noGrp="1"/>
           </p:cNvSpPr>
@@ -1784,18 +1588,13 @@
               <a:rPr lang="en-US"/>
               <a:t>Fifth level</a:t>
             </a:r>
-          </a:p>
-        </p:txBody>
-      </p:sp>
-      <p:sp>
-        <p:nvSpPr>
-          <p:cNvPr id="7" name="Date Placeholder 6">
-            <a:extLst>
-              <a:ext uri="{FF2B5EF4-FFF2-40B4-BE49-F238E27FC236}">
-                <a16:creationId xmlns:a16="http://schemas.microsoft.com/office/drawing/2014/main" id="{0D2A1609-8317-6A4A-E19F-1D7FB2136185}"/>
-              </a:ext>
-            </a:extLst>
-          </p:cNvPr>
+            <a:endParaRPr lang="en-US" dirty="0"/>
+          </a:p>
+        </p:txBody>
+      </p:sp>
+      <p:sp>
+        <p:nvSpPr>
+          <p:cNvPr id="7" name="Date Placeholder 6"/>
           <p:cNvSpPr>
             <a:spLocks noGrp="1"/>
           </p:cNvSpPr>
@@ -1810,7 +1609,7 @@
           <a:p>
             <a:fld id="{7A152AC1-BF1E-435C-86CC-AC2CC089CEC7}" type="datetimeFigureOut">
               <a:rPr lang="en-US" smtClean="0"/>
-              <a:t>1/18/2024</a:t>
+              <a:t>1/26/2024</a:t>
             </a:fld>
             <a:endParaRPr lang="en-US"/>
           </a:p>
@@ -1818,13 +1617,7 @@
       </p:sp>
       <p:sp>
         <p:nvSpPr>
-          <p:cNvPr id="8" name="Footer Placeholder 7">
-            <a:extLst>
-              <a:ext uri="{FF2B5EF4-FFF2-40B4-BE49-F238E27FC236}">
-                <a16:creationId xmlns:a16="http://schemas.microsoft.com/office/drawing/2014/main" id="{96B88C85-1ADF-011C-AED7-1D9B0BC67F95}"/>
-              </a:ext>
-            </a:extLst>
-          </p:cNvPr>
+          <p:cNvPr id="8" name="Footer Placeholder 7"/>
           <p:cNvSpPr>
             <a:spLocks noGrp="1"/>
           </p:cNvSpPr>
@@ -1843,13 +1636,7 @@
       </p:sp>
       <p:sp>
         <p:nvSpPr>
-          <p:cNvPr id="9" name="Slide Number Placeholder 8">
-            <a:extLst>
-              <a:ext uri="{FF2B5EF4-FFF2-40B4-BE49-F238E27FC236}">
-                <a16:creationId xmlns:a16="http://schemas.microsoft.com/office/drawing/2014/main" id="{BC0C9DD6-46D5-D67B-39CA-E1A19B7F43E3}"/>
-              </a:ext>
-            </a:extLst>
-          </p:cNvPr>
+          <p:cNvPr id="9" name="Slide Number Placeholder 8"/>
           <p:cNvSpPr>
             <a:spLocks noGrp="1"/>
           </p:cNvSpPr>
@@ -1873,7 +1660,7 @@
     </p:spTree>
     <p:extLst>
       <p:ext uri="{BB962C8B-B14F-4D97-AF65-F5344CB8AC3E}">
-        <p14:creationId xmlns:p14="http://schemas.microsoft.com/office/powerpoint/2010/main" val="2872056573"/>
+        <p14:creationId xmlns:p14="http://schemas.microsoft.com/office/powerpoint/2010/main" val="1525329712"/>
       </p:ext>
     </p:extLst>
   </p:cSld>
@@ -1902,13 +1689,7 @@
       </p:grpSpPr>
       <p:sp>
         <p:nvSpPr>
-          <p:cNvPr id="2" name="Title 1">
-            <a:extLst>
-              <a:ext uri="{FF2B5EF4-FFF2-40B4-BE49-F238E27FC236}">
-                <a16:creationId xmlns:a16="http://schemas.microsoft.com/office/drawing/2014/main" id="{77FB444A-7679-5C30-E63C-FF566AFF5E55}"/>
-              </a:ext>
-            </a:extLst>
-          </p:cNvPr>
+          <p:cNvPr id="2" name="Title 1"/>
           <p:cNvSpPr>
             <a:spLocks noGrp="1"/>
           </p:cNvSpPr>
@@ -1925,18 +1706,13 @@
               <a:rPr lang="en-US"/>
               <a:t>Click to edit Master title style</a:t>
             </a:r>
-          </a:p>
-        </p:txBody>
-      </p:sp>
-      <p:sp>
-        <p:nvSpPr>
-          <p:cNvPr id="3" name="Date Placeholder 2">
-            <a:extLst>
-              <a:ext uri="{FF2B5EF4-FFF2-40B4-BE49-F238E27FC236}">
-                <a16:creationId xmlns:a16="http://schemas.microsoft.com/office/drawing/2014/main" id="{DA31256F-1638-C8A2-EE1C-C8F9228F7D3C}"/>
-              </a:ext>
-            </a:extLst>
-          </p:cNvPr>
+            <a:endParaRPr lang="en-US" dirty="0"/>
+          </a:p>
+        </p:txBody>
+      </p:sp>
+      <p:sp>
+        <p:nvSpPr>
+          <p:cNvPr id="3" name="Date Placeholder 2"/>
           <p:cNvSpPr>
             <a:spLocks noGrp="1"/>
           </p:cNvSpPr>
@@ -1951,7 +1727,7 @@
           <a:p>
             <a:fld id="{7A152AC1-BF1E-435C-86CC-AC2CC089CEC7}" type="datetimeFigureOut">
               <a:rPr lang="en-US" smtClean="0"/>
-              <a:t>1/18/2024</a:t>
+              <a:t>1/26/2024</a:t>
             </a:fld>
             <a:endParaRPr lang="en-US"/>
           </a:p>
@@ -1959,13 +1735,7 @@
       </p:sp>
       <p:sp>
         <p:nvSpPr>
-          <p:cNvPr id="4" name="Footer Placeholder 3">
-            <a:extLst>
-              <a:ext uri="{FF2B5EF4-FFF2-40B4-BE49-F238E27FC236}">
-                <a16:creationId xmlns:a16="http://schemas.microsoft.com/office/drawing/2014/main" id="{684F07F4-3E61-AD99-1BAC-76904AD66AA3}"/>
-              </a:ext>
-            </a:extLst>
-          </p:cNvPr>
+          <p:cNvPr id="4" name="Footer Placeholder 3"/>
           <p:cNvSpPr>
             <a:spLocks noGrp="1"/>
           </p:cNvSpPr>
@@ -1984,13 +1754,7 @@
       </p:sp>
       <p:sp>
         <p:nvSpPr>
-          <p:cNvPr id="5" name="Slide Number Placeholder 4">
-            <a:extLst>
-              <a:ext uri="{FF2B5EF4-FFF2-40B4-BE49-F238E27FC236}">
-                <a16:creationId xmlns:a16="http://schemas.microsoft.com/office/drawing/2014/main" id="{E24B363E-73E9-AC91-BE04-B50F83C83E26}"/>
-              </a:ext>
-            </a:extLst>
-          </p:cNvPr>
+          <p:cNvPr id="5" name="Slide Number Placeholder 4"/>
           <p:cNvSpPr>
             <a:spLocks noGrp="1"/>
           </p:cNvSpPr>
@@ -2014,7 +1778,7 @@
     </p:spTree>
     <p:extLst>
       <p:ext uri="{BB962C8B-B14F-4D97-AF65-F5344CB8AC3E}">
-        <p14:creationId xmlns:p14="http://schemas.microsoft.com/office/powerpoint/2010/main" val="2511915625"/>
+        <p14:creationId xmlns:p14="http://schemas.microsoft.com/office/powerpoint/2010/main" val="2785328360"/>
       </p:ext>
     </p:extLst>
   </p:cSld>
@@ -2043,13 +1807,7 @@
       </p:grpSpPr>
       <p:sp>
         <p:nvSpPr>
-          <p:cNvPr id="2" name="Date Placeholder 1">
-            <a:extLst>
-              <a:ext uri="{FF2B5EF4-FFF2-40B4-BE49-F238E27FC236}">
-                <a16:creationId xmlns:a16="http://schemas.microsoft.com/office/drawing/2014/main" id="{2784DC14-B668-1B0F-9ED8-66773402B0CA}"/>
-              </a:ext>
-            </a:extLst>
-          </p:cNvPr>
+          <p:cNvPr id="2" name="Date Placeholder 1"/>
           <p:cNvSpPr>
             <a:spLocks noGrp="1"/>
           </p:cNvSpPr>
@@ -2064,7 +1822,7 @@
           <a:p>
             <a:fld id="{7A152AC1-BF1E-435C-86CC-AC2CC089CEC7}" type="datetimeFigureOut">
               <a:rPr lang="en-US" smtClean="0"/>
-              <a:t>1/18/2024</a:t>
+              <a:t>1/26/2024</a:t>
             </a:fld>
             <a:endParaRPr lang="en-US"/>
           </a:p>
@@ -2072,13 +1830,7 @@
       </p:sp>
       <p:sp>
         <p:nvSpPr>
-          <p:cNvPr id="3" name="Footer Placeholder 2">
-            <a:extLst>
-              <a:ext uri="{FF2B5EF4-FFF2-40B4-BE49-F238E27FC236}">
-                <a16:creationId xmlns:a16="http://schemas.microsoft.com/office/drawing/2014/main" id="{7AE83C33-5B0E-C818-FE65-9810BCB0A284}"/>
-              </a:ext>
-            </a:extLst>
-          </p:cNvPr>
+          <p:cNvPr id="3" name="Footer Placeholder 2"/>
           <p:cNvSpPr>
             <a:spLocks noGrp="1"/>
           </p:cNvSpPr>
@@ -2097,13 +1849,7 @@
       </p:sp>
       <p:sp>
         <p:nvSpPr>
-          <p:cNvPr id="4" name="Slide Number Placeholder 3">
-            <a:extLst>
-              <a:ext uri="{FF2B5EF4-FFF2-40B4-BE49-F238E27FC236}">
-                <a16:creationId xmlns:a16="http://schemas.microsoft.com/office/drawing/2014/main" id="{75164B41-8E24-C207-0152-D4FE45ADC49C}"/>
-              </a:ext>
-            </a:extLst>
-          </p:cNvPr>
+          <p:cNvPr id="4" name="Slide Number Placeholder 3"/>
           <p:cNvSpPr>
             <a:spLocks noGrp="1"/>
           </p:cNvSpPr>
@@ -2127,7 +1873,7 @@
     </p:spTree>
     <p:extLst>
       <p:ext uri="{BB962C8B-B14F-4D97-AF65-F5344CB8AC3E}">
-        <p14:creationId xmlns:p14="http://schemas.microsoft.com/office/powerpoint/2010/main" val="1881870740"/>
+        <p14:creationId xmlns:p14="http://schemas.microsoft.com/office/powerpoint/2010/main" val="824091957"/>
       </p:ext>
     </p:extLst>
   </p:cSld>
@@ -2156,13 +1902,7 @@
       </p:grpSpPr>
       <p:sp>
         <p:nvSpPr>
-          <p:cNvPr id="2" name="Title 1">
-            <a:extLst>
-              <a:ext uri="{FF2B5EF4-FFF2-40B4-BE49-F238E27FC236}">
-                <a16:creationId xmlns:a16="http://schemas.microsoft.com/office/drawing/2014/main" id="{E8588A03-7D78-101B-5E8D-99B4B2162A49}"/>
-              </a:ext>
-            </a:extLst>
-          </p:cNvPr>
+          <p:cNvPr id="2" name="Title 1"/>
           <p:cNvSpPr>
             <a:spLocks noGrp="1"/>
           </p:cNvSpPr>
@@ -2188,18 +1928,13 @@
               <a:rPr lang="en-US"/>
               <a:t>Click to edit Master title style</a:t>
             </a:r>
-          </a:p>
-        </p:txBody>
-      </p:sp>
-      <p:sp>
-        <p:nvSpPr>
-          <p:cNvPr id="3" name="Content Placeholder 2">
-            <a:extLst>
-              <a:ext uri="{FF2B5EF4-FFF2-40B4-BE49-F238E27FC236}">
-                <a16:creationId xmlns:a16="http://schemas.microsoft.com/office/drawing/2014/main" id="{0D93715B-1BC7-7D2E-7A1B-D3475DB3E3E5}"/>
-              </a:ext>
-            </a:extLst>
-          </p:cNvPr>
+            <a:endParaRPr lang="en-US" dirty="0"/>
+          </a:p>
+        </p:txBody>
+      </p:sp>
+      <p:sp>
+        <p:nvSpPr>
+          <p:cNvPr id="3" name="Content Placeholder 2"/>
           <p:cNvSpPr>
             <a:spLocks noGrp="1"/>
           </p:cNvSpPr>
@@ -2278,18 +2013,13 @@
               <a:rPr lang="en-US"/>
               <a:t>Fifth level</a:t>
             </a:r>
-          </a:p>
-        </p:txBody>
-      </p:sp>
-      <p:sp>
-        <p:nvSpPr>
-          <p:cNvPr id="4" name="Text Placeholder 3">
-            <a:extLst>
-              <a:ext uri="{FF2B5EF4-FFF2-40B4-BE49-F238E27FC236}">
-                <a16:creationId xmlns:a16="http://schemas.microsoft.com/office/drawing/2014/main" id="{50BDE22C-0BBE-84D3-BDD7-2A024B2D25F8}"/>
-              </a:ext>
-            </a:extLst>
-          </p:cNvPr>
+            <a:endParaRPr lang="en-US" dirty="0"/>
+          </a:p>
+        </p:txBody>
+      </p:sp>
+      <p:sp>
+        <p:nvSpPr>
+          <p:cNvPr id="4" name="Text Placeholder 3"/>
           <p:cNvSpPr>
             <a:spLocks noGrp="1"/>
           </p:cNvSpPr>
@@ -2354,13 +2084,7 @@
       </p:sp>
       <p:sp>
         <p:nvSpPr>
-          <p:cNvPr id="5" name="Date Placeholder 4">
-            <a:extLst>
-              <a:ext uri="{FF2B5EF4-FFF2-40B4-BE49-F238E27FC236}">
-                <a16:creationId xmlns:a16="http://schemas.microsoft.com/office/drawing/2014/main" id="{54FEB618-7A36-CF78-6C65-3520FB24EFD1}"/>
-              </a:ext>
-            </a:extLst>
-          </p:cNvPr>
+          <p:cNvPr id="5" name="Date Placeholder 4"/>
           <p:cNvSpPr>
             <a:spLocks noGrp="1"/>
           </p:cNvSpPr>
@@ -2375,7 +2099,7 @@
           <a:p>
             <a:fld id="{7A152AC1-BF1E-435C-86CC-AC2CC089CEC7}" type="datetimeFigureOut">
               <a:rPr lang="en-US" smtClean="0"/>
-              <a:t>1/18/2024</a:t>
+              <a:t>1/26/2024</a:t>
             </a:fld>
             <a:endParaRPr lang="en-US"/>
           </a:p>
@@ -2383,13 +2107,7 @@
       </p:sp>
       <p:sp>
         <p:nvSpPr>
-          <p:cNvPr id="6" name="Footer Placeholder 5">
-            <a:extLst>
-              <a:ext uri="{FF2B5EF4-FFF2-40B4-BE49-F238E27FC236}">
-                <a16:creationId xmlns:a16="http://schemas.microsoft.com/office/drawing/2014/main" id="{EC47F29A-D8CC-9D81-CBEC-69C84AF322F3}"/>
-              </a:ext>
-            </a:extLst>
-          </p:cNvPr>
+          <p:cNvPr id="6" name="Footer Placeholder 5"/>
           <p:cNvSpPr>
             <a:spLocks noGrp="1"/>
           </p:cNvSpPr>
@@ -2408,13 +2126,7 @@
       </p:sp>
       <p:sp>
         <p:nvSpPr>
-          <p:cNvPr id="7" name="Slide Number Placeholder 6">
-            <a:extLst>
-              <a:ext uri="{FF2B5EF4-FFF2-40B4-BE49-F238E27FC236}">
-                <a16:creationId xmlns:a16="http://schemas.microsoft.com/office/drawing/2014/main" id="{C7F3A18A-73C0-7A60-AAEB-F7623AEBDE77}"/>
-              </a:ext>
-            </a:extLst>
-          </p:cNvPr>
+          <p:cNvPr id="7" name="Slide Number Placeholder 6"/>
           <p:cNvSpPr>
             <a:spLocks noGrp="1"/>
           </p:cNvSpPr>
@@ -2438,7 +2150,7 @@
     </p:spTree>
     <p:extLst>
       <p:ext uri="{BB962C8B-B14F-4D97-AF65-F5344CB8AC3E}">
-        <p14:creationId xmlns:p14="http://schemas.microsoft.com/office/powerpoint/2010/main" val="911123347"/>
+        <p14:creationId xmlns:p14="http://schemas.microsoft.com/office/powerpoint/2010/main" val="2219341220"/>
       </p:ext>
     </p:extLst>
   </p:cSld>
@@ -2467,13 +2179,7 @@
       </p:grpSpPr>
       <p:sp>
         <p:nvSpPr>
-          <p:cNvPr id="2" name="Title 1">
-            <a:extLst>
-              <a:ext uri="{FF2B5EF4-FFF2-40B4-BE49-F238E27FC236}">
-                <a16:creationId xmlns:a16="http://schemas.microsoft.com/office/drawing/2014/main" id="{546361CD-E356-5530-993D-5F7B1689C7A9}"/>
-              </a:ext>
-            </a:extLst>
-          </p:cNvPr>
+          <p:cNvPr id="2" name="Title 1"/>
           <p:cNvSpPr>
             <a:spLocks noGrp="1"/>
           </p:cNvSpPr>
@@ -2499,20 +2205,15 @@
               <a:rPr lang="en-US"/>
               <a:t>Click to edit Master title style</a:t>
             </a:r>
-          </a:p>
-        </p:txBody>
-      </p:sp>
-      <p:sp>
-        <p:nvSpPr>
-          <p:cNvPr id="3" name="Picture Placeholder 2">
-            <a:extLst>
-              <a:ext uri="{FF2B5EF4-FFF2-40B4-BE49-F238E27FC236}">
-                <a16:creationId xmlns:a16="http://schemas.microsoft.com/office/drawing/2014/main" id="{685AE2F8-71C3-AC08-FFFE-3827EDBDA72D}"/>
-              </a:ext>
-            </a:extLst>
-          </p:cNvPr>
-          <p:cNvSpPr>
-            <a:spLocks noGrp="1"/>
+            <a:endParaRPr lang="en-US" dirty="0"/>
+          </a:p>
+        </p:txBody>
+      </p:sp>
+      <p:sp>
+        <p:nvSpPr>
+          <p:cNvPr id="3" name="Picture Placeholder 2"/>
+          <p:cNvSpPr>
+            <a:spLocks noGrp="1" noChangeAspect="1"/>
           </p:cNvSpPr>
           <p:nvPr>
             <p:ph type="pic" idx="1"/>
@@ -2525,7 +2226,7 @@
           </a:xfrm>
         </p:spPr>
         <p:txBody>
-          <a:bodyPr/>
+          <a:bodyPr anchor="t"/>
           <a:lstStyle>
             <a:lvl1pPr marL="0" indent="0">
               <a:buNone/>
@@ -2565,19 +2266,17 @@
             </a:lvl9pPr>
           </a:lstStyle>
           <a:p>
-            <a:endParaRPr lang="en-US"/>
-          </a:p>
-        </p:txBody>
-      </p:sp>
-      <p:sp>
-        <p:nvSpPr>
-          <p:cNvPr id="4" name="Text Placeholder 3">
-            <a:extLst>
-              <a:ext uri="{FF2B5EF4-FFF2-40B4-BE49-F238E27FC236}">
-                <a16:creationId xmlns:a16="http://schemas.microsoft.com/office/drawing/2014/main" id="{3057B188-2F51-82C7-7A12-9ACB9F4471D3}"/>
-              </a:ext>
-            </a:extLst>
-          </p:cNvPr>
+            <a:r>
+              <a:rPr lang="en-US"/>
+              <a:t>Click icon to add picture</a:t>
+            </a:r>
+            <a:endParaRPr lang="en-US" dirty="0"/>
+          </a:p>
+        </p:txBody>
+      </p:sp>
+      <p:sp>
+        <p:nvSpPr>
+          <p:cNvPr id="4" name="Text Placeholder 3"/>
           <p:cNvSpPr>
             <a:spLocks noGrp="1"/>
           </p:cNvSpPr>
@@ -2642,13 +2341,7 @@
       </p:sp>
       <p:sp>
         <p:nvSpPr>
-          <p:cNvPr id="5" name="Date Placeholder 4">
-            <a:extLst>
-              <a:ext uri="{FF2B5EF4-FFF2-40B4-BE49-F238E27FC236}">
-                <a16:creationId xmlns:a16="http://schemas.microsoft.com/office/drawing/2014/main" id="{B151AEE0-D54F-F837-8020-E359FE70E6C9}"/>
-              </a:ext>
-            </a:extLst>
-          </p:cNvPr>
+          <p:cNvPr id="5" name="Date Placeholder 4"/>
           <p:cNvSpPr>
             <a:spLocks noGrp="1"/>
           </p:cNvSpPr>
@@ -2663,7 +2356,7 @@
           <a:p>
             <a:fld id="{7A152AC1-BF1E-435C-86CC-AC2CC089CEC7}" type="datetimeFigureOut">
               <a:rPr lang="en-US" smtClean="0"/>
-              <a:t>1/18/2024</a:t>
+              <a:t>1/26/2024</a:t>
             </a:fld>
             <a:endParaRPr lang="en-US"/>
           </a:p>
@@ -2671,13 +2364,7 @@
       </p:sp>
       <p:sp>
         <p:nvSpPr>
-          <p:cNvPr id="6" name="Footer Placeholder 5">
-            <a:extLst>
-              <a:ext uri="{FF2B5EF4-FFF2-40B4-BE49-F238E27FC236}">
-                <a16:creationId xmlns:a16="http://schemas.microsoft.com/office/drawing/2014/main" id="{2E35DD3D-CD5E-9210-C29E-2E6AB5A65E0C}"/>
-              </a:ext>
-            </a:extLst>
-          </p:cNvPr>
+          <p:cNvPr id="6" name="Footer Placeholder 5"/>
           <p:cNvSpPr>
             <a:spLocks noGrp="1"/>
           </p:cNvSpPr>
@@ -2696,13 +2383,7 @@
       </p:sp>
       <p:sp>
         <p:nvSpPr>
-          <p:cNvPr id="7" name="Slide Number Placeholder 6">
-            <a:extLst>
-              <a:ext uri="{FF2B5EF4-FFF2-40B4-BE49-F238E27FC236}">
-                <a16:creationId xmlns:a16="http://schemas.microsoft.com/office/drawing/2014/main" id="{480737D0-E3B6-2027-CD6F-2913C707D9D6}"/>
-              </a:ext>
-            </a:extLst>
-          </p:cNvPr>
+          <p:cNvPr id="7" name="Slide Number Placeholder 6"/>
           <p:cNvSpPr>
             <a:spLocks noGrp="1"/>
           </p:cNvSpPr>
@@ -2726,7 +2407,7 @@
     </p:spTree>
     <p:extLst>
       <p:ext uri="{BB962C8B-B14F-4D97-AF65-F5344CB8AC3E}">
-        <p14:creationId xmlns:p14="http://schemas.microsoft.com/office/powerpoint/2010/main" val="1023582510"/>
+        <p14:creationId xmlns:p14="http://schemas.microsoft.com/office/powerpoint/2010/main" val="1600078140"/>
       </p:ext>
     </p:extLst>
   </p:cSld>
@@ -2760,13 +2441,7 @@
       </p:grpSpPr>
       <p:sp>
         <p:nvSpPr>
-          <p:cNvPr id="2" name="Title Placeholder 1">
-            <a:extLst>
-              <a:ext uri="{FF2B5EF4-FFF2-40B4-BE49-F238E27FC236}">
-                <a16:creationId xmlns:a16="http://schemas.microsoft.com/office/drawing/2014/main" id="{EDBC7026-0BB4-60F7-FD7D-B47560933599}"/>
-              </a:ext>
-            </a:extLst>
-          </p:cNvPr>
+          <p:cNvPr id="2" name="Title Placeholder 1"/>
           <p:cNvSpPr>
             <a:spLocks noGrp="1"/>
           </p:cNvSpPr>
@@ -2793,18 +2468,13 @@
               <a:rPr lang="en-US"/>
               <a:t>Click to edit Master title style</a:t>
             </a:r>
-          </a:p>
-        </p:txBody>
-      </p:sp>
-      <p:sp>
-        <p:nvSpPr>
-          <p:cNvPr id="3" name="Text Placeholder 2">
-            <a:extLst>
-              <a:ext uri="{FF2B5EF4-FFF2-40B4-BE49-F238E27FC236}">
-                <a16:creationId xmlns:a16="http://schemas.microsoft.com/office/drawing/2014/main" id="{58E34387-7A23-FBD4-2C2C-A274FB2F94B4}"/>
-              </a:ext>
-            </a:extLst>
-          </p:cNvPr>
+            <a:endParaRPr lang="en-US" dirty="0"/>
+          </a:p>
+        </p:txBody>
+      </p:sp>
+      <p:sp>
+        <p:nvSpPr>
+          <p:cNvPr id="3" name="Text Placeholder 2"/>
           <p:cNvSpPr>
             <a:spLocks noGrp="1"/>
           </p:cNvSpPr>
@@ -2860,18 +2530,13 @@
               <a:rPr lang="en-US"/>
               <a:t>Fifth level</a:t>
             </a:r>
-          </a:p>
-        </p:txBody>
-      </p:sp>
-      <p:sp>
-        <p:nvSpPr>
-          <p:cNvPr id="4" name="Date Placeholder 3">
-            <a:extLst>
-              <a:ext uri="{FF2B5EF4-FFF2-40B4-BE49-F238E27FC236}">
-                <a16:creationId xmlns:a16="http://schemas.microsoft.com/office/drawing/2014/main" id="{6F1FE0FC-7791-5327-8B78-0D31A7EC556C}"/>
-              </a:ext>
-            </a:extLst>
-          </p:cNvPr>
+            <a:endParaRPr lang="en-US" dirty="0"/>
+          </a:p>
+        </p:txBody>
+      </p:sp>
+      <p:sp>
+        <p:nvSpPr>
+          <p:cNvPr id="4" name="Date Placeholder 3"/>
           <p:cNvSpPr>
             <a:spLocks noGrp="1"/>
           </p:cNvSpPr>
@@ -2904,7 +2569,7 @@
           <a:p>
             <a:fld id="{7A152AC1-BF1E-435C-86CC-AC2CC089CEC7}" type="datetimeFigureOut">
               <a:rPr lang="en-US" smtClean="0"/>
-              <a:t>1/18/2024</a:t>
+              <a:t>1/26/2024</a:t>
             </a:fld>
             <a:endParaRPr lang="en-US"/>
           </a:p>
@@ -2912,13 +2577,7 @@
       </p:sp>
       <p:sp>
         <p:nvSpPr>
-          <p:cNvPr id="5" name="Footer Placeholder 4">
-            <a:extLst>
-              <a:ext uri="{FF2B5EF4-FFF2-40B4-BE49-F238E27FC236}">
-                <a16:creationId xmlns:a16="http://schemas.microsoft.com/office/drawing/2014/main" id="{C9B26F5E-134F-D4A2-EEF0-2DFF221211FD}"/>
-              </a:ext>
-            </a:extLst>
-          </p:cNvPr>
+          <p:cNvPr id="5" name="Footer Placeholder 4"/>
           <p:cNvSpPr>
             <a:spLocks noGrp="1"/>
           </p:cNvSpPr>
@@ -2955,13 +2614,7 @@
       </p:sp>
       <p:sp>
         <p:nvSpPr>
-          <p:cNvPr id="6" name="Slide Number Placeholder 5">
-            <a:extLst>
-              <a:ext uri="{FF2B5EF4-FFF2-40B4-BE49-F238E27FC236}">
-                <a16:creationId xmlns:a16="http://schemas.microsoft.com/office/drawing/2014/main" id="{9388E7A8-9A0F-4CA3-73F4-8ED24864E25B}"/>
-              </a:ext>
-            </a:extLst>
-          </p:cNvPr>
+          <p:cNvPr id="6" name="Slide Number Placeholder 5"/>
           <p:cNvSpPr>
             <a:spLocks noGrp="1"/>
           </p:cNvSpPr>
@@ -3003,23 +2656,23 @@
     </p:spTree>
     <p:extLst>
       <p:ext uri="{BB962C8B-B14F-4D97-AF65-F5344CB8AC3E}">
-        <p14:creationId xmlns:p14="http://schemas.microsoft.com/office/powerpoint/2010/main" val="95090036"/>
+        <p14:creationId xmlns:p14="http://schemas.microsoft.com/office/powerpoint/2010/main" val="41958532"/>
       </p:ext>
     </p:extLst>
   </p:cSld>
-  <p:clrMap bg1="lt1" tx1="dk1" bg2="lt2" tx2="dk2" accent1="accent1" accent2="accent2" accent3="accent3" accent4="accent4" accent5="accent5" accent6="accent6" hlink="hlink" folHlink="folHlink"/>
+  <p:clrMap bg1="dk1" tx1="lt1" bg2="dk2" tx2="lt2" accent1="accent1" accent2="accent2" accent3="accent3" accent4="accent4" accent5="accent5" accent6="accent6" hlink="hlink" folHlink="folHlink"/>
   <p:sldLayoutIdLst>
-    <p:sldLayoutId id="2147483649" r:id="rId1"/>
-    <p:sldLayoutId id="2147483650" r:id="rId2"/>
-    <p:sldLayoutId id="2147483651" r:id="rId3"/>
-    <p:sldLayoutId id="2147483652" r:id="rId4"/>
-    <p:sldLayoutId id="2147483653" r:id="rId5"/>
-    <p:sldLayoutId id="2147483654" r:id="rId6"/>
-    <p:sldLayoutId id="2147483655" r:id="rId7"/>
-    <p:sldLayoutId id="2147483656" r:id="rId8"/>
-    <p:sldLayoutId id="2147483657" r:id="rId9"/>
-    <p:sldLayoutId id="2147483658" r:id="rId10"/>
-    <p:sldLayoutId id="2147483659" r:id="rId11"/>
+    <p:sldLayoutId id="2147483661" r:id="rId1"/>
+    <p:sldLayoutId id="2147483662" r:id="rId2"/>
+    <p:sldLayoutId id="2147483663" r:id="rId3"/>
+    <p:sldLayoutId id="2147483664" r:id="rId4"/>
+    <p:sldLayoutId id="2147483665" r:id="rId5"/>
+    <p:sldLayoutId id="2147483666" r:id="rId6"/>
+    <p:sldLayoutId id="2147483667" r:id="rId7"/>
+    <p:sldLayoutId id="2147483668" r:id="rId8"/>
+    <p:sldLayoutId id="2147483669" r:id="rId9"/>
+    <p:sldLayoutId id="2147483670" r:id="rId10"/>
+    <p:sldLayoutId id="2147483671" r:id="rId11"/>
   </p:sldLayoutIdLst>
   <p:txStyles>
     <p:titleStyle>
@@ -3321,6 +2974,117 @@
           <a:chExt cx="0" cy="0"/>
         </a:xfrm>
       </p:grpSpPr>
+      <p:grpSp>
+        <p:nvGrpSpPr>
+          <p:cNvPr id="6" name="Group 5">
+            <a:extLst>
+              <a:ext uri="{FF2B5EF4-FFF2-40B4-BE49-F238E27FC236}">
+                <a16:creationId xmlns:a16="http://schemas.microsoft.com/office/drawing/2014/main" id="{FF64C8B2-9A6C-A6B9-D581-821CD2DFC10D}"/>
+              </a:ext>
+            </a:extLst>
+          </p:cNvPr>
+          <p:cNvGrpSpPr/>
+          <p:nvPr/>
+        </p:nvGrpSpPr>
+        <p:grpSpPr>
+          <a:xfrm>
+            <a:off x="138112" y="369388"/>
+            <a:ext cx="11915775" cy="5447212"/>
+            <a:chOff x="-1943099" y="0"/>
+            <a:chExt cx="15001874" cy="6858000"/>
+          </a:xfrm>
+        </p:grpSpPr>
+        <p:pic>
+          <p:nvPicPr>
+            <p:cNvPr id="4" name="Picture 3">
+              <a:extLst>
+                <a:ext uri="{FF2B5EF4-FFF2-40B4-BE49-F238E27FC236}">
+                  <a16:creationId xmlns:a16="http://schemas.microsoft.com/office/drawing/2014/main" id="{D42E25FD-7586-5900-A3C8-601E6763B0B4}"/>
+                </a:ext>
+              </a:extLst>
+            </p:cNvPr>
+            <p:cNvPicPr>
+              <a:picLocks noChangeAspect="1"/>
+            </p:cNvPicPr>
+            <p:nvPr/>
+          </p:nvPicPr>
+          <p:blipFill>
+            <a:blip r:embed="rId2"/>
+            <a:stretch>
+              <a:fillRect/>
+            </a:stretch>
+          </p:blipFill>
+          <p:spPr>
+            <a:xfrm>
+              <a:off x="884464" y="0"/>
+              <a:ext cx="10423072" cy="6858000"/>
+            </a:xfrm>
+            <a:prstGeom prst="rect">
+              <a:avLst/>
+            </a:prstGeom>
+          </p:spPr>
+        </p:pic>
+        <p:pic>
+          <p:nvPicPr>
+            <p:cNvPr id="5" name="Picture 4">
+              <a:extLst>
+                <a:ext uri="{FF2B5EF4-FFF2-40B4-BE49-F238E27FC236}">
+                  <a16:creationId xmlns:a16="http://schemas.microsoft.com/office/drawing/2014/main" id="{DD52F2F9-6E86-7235-E281-69F66D43538E}"/>
+                </a:ext>
+              </a:extLst>
+            </p:cNvPr>
+            <p:cNvPicPr>
+              <a:picLocks noChangeAspect="1"/>
+            </p:cNvPicPr>
+            <p:nvPr/>
+          </p:nvPicPr>
+          <p:blipFill>
+            <a:blip r:embed="rId3"/>
+            <a:stretch>
+              <a:fillRect/>
+            </a:stretch>
+          </p:blipFill>
+          <p:spPr>
+            <a:xfrm>
+              <a:off x="-1943099" y="2613944"/>
+              <a:ext cx="15001874" cy="2562064"/>
+            </a:xfrm>
+            <a:prstGeom prst="rect">
+              <a:avLst/>
+            </a:prstGeom>
+          </p:spPr>
+        </p:pic>
+      </p:grpSp>
+    </p:spTree>
+    <p:extLst>
+      <p:ext uri="{BB962C8B-B14F-4D97-AF65-F5344CB8AC3E}">
+        <p14:creationId xmlns:p14="http://schemas.microsoft.com/office/powerpoint/2010/main" val="2347859104"/>
+      </p:ext>
+    </p:extLst>
+  </p:cSld>
+  <p:clrMapOvr>
+    <a:masterClrMapping/>
+  </p:clrMapOvr>
+</p:sld>
+</file>
+
+<file path=ppt/slides/slide2.xml><?xml version="1.0" encoding="utf-8"?>
+<p:sld xmlns:a="http://schemas.openxmlformats.org/drawingml/2006/main" xmlns:r="http://schemas.openxmlformats.org/officeDocument/2006/relationships" xmlns:p="http://schemas.openxmlformats.org/presentationml/2006/main">
+  <p:cSld>
+    <p:spTree>
+      <p:nvGrpSpPr>
+        <p:cNvPr id="1" name=""/>
+        <p:cNvGrpSpPr/>
+        <p:nvPr/>
+      </p:nvGrpSpPr>
+      <p:grpSpPr>
+        <a:xfrm>
+          <a:off x="0" y="0"/>
+          <a:ext cx="0" cy="0"/>
+          <a:chOff x="0" y="0"/>
+          <a:chExt cx="0" cy="0"/>
+        </a:xfrm>
+      </p:grpSpPr>
       <p:sp>
         <p:nvSpPr>
           <p:cNvPr id="4" name="Rectangle 3">
@@ -3335,8 +3099,8 @@
         </p:nvSpPr>
         <p:spPr>
           <a:xfrm>
-            <a:off x="3019425" y="1009650"/>
-            <a:ext cx="6105525" cy="4486275"/>
+            <a:off x="160867" y="169332"/>
+            <a:ext cx="5765800" cy="3886201"/>
           </a:xfrm>
           <a:prstGeom prst="rect">
             <a:avLst/>
@@ -3405,7 +3169,7 @@
           </p:cNvPicPr>
           <p:nvPr/>
         </p:nvPicPr>
-        <p:blipFill>
+        <p:blipFill rotWithShape="1">
           <a:blip r:embed="rId2">
             <a:clrChange>
               <a:clrFrom>
@@ -3423,15 +3187,13 @@
               </a:ext>
             </a:extLst>
           </a:blip>
-          <a:srcRect/>
-          <a:stretch>
-            <a:fillRect/>
-          </a:stretch>
+          <a:srcRect l="8025" t="21728" r="7902" b="21605"/>
+          <a:stretch/>
         </p:blipFill>
         <p:spPr bwMode="auto">
           <a:xfrm>
-            <a:off x="2667000" y="0"/>
-            <a:ext cx="6858000" cy="6858000"/>
+            <a:off x="160866" y="169332"/>
+            <a:ext cx="5765800" cy="3886201"/>
           </a:xfrm>
           <a:prstGeom prst="rect">
             <a:avLst/>
@@ -3462,7 +3224,7 @@
         </p:nvSpPr>
         <p:spPr>
           <a:xfrm>
-            <a:off x="5392737" y="3152001"/>
+            <a:off x="2336270" y="1831201"/>
             <a:ext cx="1358900" cy="553998"/>
           </a:xfrm>
           <a:prstGeom prst="rect">
@@ -3505,7 +3267,7 @@
 <file path=ppt/theme/theme1.xml><?xml version="1.0" encoding="utf-8"?>
 <a:theme xmlns:a="http://schemas.openxmlformats.org/drawingml/2006/main" name="Office Theme">
   <a:themeElements>
-    <a:clrScheme name="Office">
+    <a:clrScheme name="Office Theme">
       <a:dk1>
         <a:sysClr val="windowText" lastClr="000000"/>
       </a:dk1>
@@ -3543,7 +3305,7 @@
         <a:srgbClr val="954F72"/>
       </a:folHlink>
     </a:clrScheme>
-    <a:fontScheme name="Office">
+    <a:fontScheme name="Office Theme">
       <a:majorFont>
         <a:latin typeface="Calibri Light" panose="020F0302020204030204"/>
         <a:ea typeface=""/>
@@ -3578,23 +3340,6 @@
         <a:font script="Viet" typeface="Times New Roman"/>
         <a:font script="Uigh" typeface="Microsoft Uighur"/>
         <a:font script="Geor" typeface="Sylfaen"/>
-        <a:font script="Armn" typeface="Arial"/>
-        <a:font script="Bugi" typeface="Leelawadee UI"/>
-        <a:font script="Bopo" typeface="Microsoft JhengHei"/>
-        <a:font script="Java" typeface="Javanese Text"/>
-        <a:font script="Lisu" typeface="Segoe UI"/>
-        <a:font script="Mymr" typeface="Myanmar Text"/>
-        <a:font script="Nkoo" typeface="Ebrima"/>
-        <a:font script="Olck" typeface="Nirmala UI"/>
-        <a:font script="Osma" typeface="Ebrima"/>
-        <a:font script="Phag" typeface="Phagspa"/>
-        <a:font script="Syrn" typeface="Estrangelo Edessa"/>
-        <a:font script="Syrj" typeface="Estrangelo Edessa"/>
-        <a:font script="Syre" typeface="Estrangelo Edessa"/>
-        <a:font script="Sora" typeface="Nirmala UI"/>
-        <a:font script="Tale" typeface="Microsoft Tai Le"/>
-        <a:font script="Talu" typeface="Microsoft New Tai Lue"/>
-        <a:font script="Tfng" typeface="Ebrima"/>
       </a:majorFont>
       <a:minorFont>
         <a:latin typeface="Calibri" panose="020F0502020204030204"/>
@@ -3630,26 +3375,9 @@
         <a:font script="Viet" typeface="Arial"/>
         <a:font script="Uigh" typeface="Microsoft Uighur"/>
         <a:font script="Geor" typeface="Sylfaen"/>
-        <a:font script="Armn" typeface="Arial"/>
-        <a:font script="Bugi" typeface="Leelawadee UI"/>
-        <a:font script="Bopo" typeface="Microsoft JhengHei"/>
-        <a:font script="Java" typeface="Javanese Text"/>
-        <a:font script="Lisu" typeface="Segoe UI"/>
-        <a:font script="Mymr" typeface="Myanmar Text"/>
-        <a:font script="Nkoo" typeface="Ebrima"/>
-        <a:font script="Olck" typeface="Nirmala UI"/>
-        <a:font script="Osma" typeface="Ebrima"/>
-        <a:font script="Phag" typeface="Phagspa"/>
-        <a:font script="Syrn" typeface="Estrangelo Edessa"/>
-        <a:font script="Syrj" typeface="Estrangelo Edessa"/>
-        <a:font script="Syre" typeface="Estrangelo Edessa"/>
-        <a:font script="Sora" typeface="Nirmala UI"/>
-        <a:font script="Tale" typeface="Microsoft Tai Le"/>
-        <a:font script="Talu" typeface="Microsoft New Tai Lue"/>
-        <a:font script="Tfng" typeface="Ebrima"/>
       </a:minorFont>
     </a:fontScheme>
-    <a:fmtScheme name="Office">
+    <a:fmtScheme name="Office Theme">
       <a:fillStyleLst>
         <a:solidFill>
           <a:schemeClr val="phClr"/>
@@ -3791,7 +3519,7 @@
   <a:extraClrSchemeLst/>
   <a:extLst>
     <a:ext uri="{05A4C25C-085E-4340-85A3-A5531E510DB2}">
-      <thm15:themeFamily xmlns:thm15="http://schemas.microsoft.com/office/thememl/2012/main" name="Office Theme" id="{62F939B6-93AF-4DB8-9C6B-D6C7DFDC589F}" vid="{4A3C46E8-61CC-4603-A589-7422A47A8E4A}"/>
+      <thm15:themeFamily xmlns:thm15="http://schemas.microsoft.com/office/thememl/2012/main" name="Office 2013 - 2022 Theme" id="{62F939B6-93AF-4DB8-9C6B-D6C7DFDC589F}" vid="{4F46216B-77A9-411A-B9D3-5023FCB70208}"/>
     </a:ext>
   </a:extLst>
 </a:theme>

</xml_diff>